<commit_message>
On hover icons added to Schedule demo.
</commit_message>
<xml_diff>
--- a/Open_Items.pptx
+++ b/Open_Items.pptx
@@ -3699,7 +3699,7 @@
           <a:p>
             <a:r>
               <a:rPr lang="en-US" dirty="0"/>
-              <a:t>Open Issues Doc</a:t>
+              <a:t>Open Items</a:t>
             </a:r>
           </a:p>
         </p:txBody>
@@ -3878,7 +3878,7 @@
           <a:p>
             <a:r>
               <a:rPr lang="en-US" dirty="0"/>
-              <a:t>Right Click Options: Should avoid on webpages. This capability is unusual and not expected and therefore not obvious to the user.</a:t>
+              <a:t>Right Click Options: (Kelsey’s opinion) Should be avoided on webpages. This capability is unusual and not expected in web applications and therefore not obvious to the user.</a:t>
             </a:r>
           </a:p>
         </p:txBody>

</xml_diff>